<commit_message>
Added 2 more gmap visuals to reports/output folder
</commit_message>
<xml_diff>
--- a/Reports/Project Jay.pptx
+++ b/Reports/Project Jay.pptx
@@ -203,7 +203,7 @@
           <a:p>
             <a:fld id="{72005AEE-BF9D-4F28-96DD-D17F0357519F}" type="datetimeFigureOut">
               <a:rPr lang="en-US" smtClean="0"/>
-              <a:t>11/21/2019</a:t>
+              <a:t>11/22/2019</a:t>
             </a:fld>
             <a:endParaRPr lang="en-US"/>
           </a:p>
@@ -701,7 +701,7 @@
           <a:p>
             <a:fld id="{52626DC5-4832-44B9-B024-6945A7D6FF33}" type="datetimeFigureOut">
               <a:rPr lang="en-US" smtClean="0"/>
-              <a:t>11/21/2019</a:t>
+              <a:t>11/22/2019</a:t>
             </a:fld>
             <a:endParaRPr lang="en-US"/>
           </a:p>
@@ -899,7 +899,7 @@
           <a:p>
             <a:fld id="{52626DC5-4832-44B9-B024-6945A7D6FF33}" type="datetimeFigureOut">
               <a:rPr lang="en-US" smtClean="0"/>
-              <a:t>11/21/2019</a:t>
+              <a:t>11/22/2019</a:t>
             </a:fld>
             <a:endParaRPr lang="en-US"/>
           </a:p>
@@ -1107,7 +1107,7 @@
           <a:p>
             <a:fld id="{52626DC5-4832-44B9-B024-6945A7D6FF33}" type="datetimeFigureOut">
               <a:rPr lang="en-US" smtClean="0"/>
-              <a:t>11/21/2019</a:t>
+              <a:t>11/22/2019</a:t>
             </a:fld>
             <a:endParaRPr lang="en-US"/>
           </a:p>
@@ -1305,7 +1305,7 @@
           <a:p>
             <a:fld id="{52626DC5-4832-44B9-B024-6945A7D6FF33}" type="datetimeFigureOut">
               <a:rPr lang="en-US" smtClean="0"/>
-              <a:t>11/21/2019</a:t>
+              <a:t>11/22/2019</a:t>
             </a:fld>
             <a:endParaRPr lang="en-US"/>
           </a:p>
@@ -1580,7 +1580,7 @@
           <a:p>
             <a:fld id="{52626DC5-4832-44B9-B024-6945A7D6FF33}" type="datetimeFigureOut">
               <a:rPr lang="en-US" smtClean="0"/>
-              <a:t>11/21/2019</a:t>
+              <a:t>11/22/2019</a:t>
             </a:fld>
             <a:endParaRPr lang="en-US"/>
           </a:p>
@@ -1845,7 +1845,7 @@
           <a:p>
             <a:fld id="{52626DC5-4832-44B9-B024-6945A7D6FF33}" type="datetimeFigureOut">
               <a:rPr lang="en-US" smtClean="0"/>
-              <a:t>11/21/2019</a:t>
+              <a:t>11/22/2019</a:t>
             </a:fld>
             <a:endParaRPr lang="en-US"/>
           </a:p>
@@ -2257,7 +2257,7 @@
           <a:p>
             <a:fld id="{52626DC5-4832-44B9-B024-6945A7D6FF33}" type="datetimeFigureOut">
               <a:rPr lang="en-US" smtClean="0"/>
-              <a:t>11/21/2019</a:t>
+              <a:t>11/22/2019</a:t>
             </a:fld>
             <a:endParaRPr lang="en-US"/>
           </a:p>
@@ -2398,7 +2398,7 @@
           <a:p>
             <a:fld id="{52626DC5-4832-44B9-B024-6945A7D6FF33}" type="datetimeFigureOut">
               <a:rPr lang="en-US" smtClean="0"/>
-              <a:t>11/21/2019</a:t>
+              <a:t>11/22/2019</a:t>
             </a:fld>
             <a:endParaRPr lang="en-US"/>
           </a:p>
@@ -2511,7 +2511,7 @@
           <a:p>
             <a:fld id="{52626DC5-4832-44B9-B024-6945A7D6FF33}" type="datetimeFigureOut">
               <a:rPr lang="en-US" smtClean="0"/>
-              <a:t>11/21/2019</a:t>
+              <a:t>11/22/2019</a:t>
             </a:fld>
             <a:endParaRPr lang="en-US"/>
           </a:p>
@@ -2822,7 +2822,7 @@
           <a:p>
             <a:fld id="{52626DC5-4832-44B9-B024-6945A7D6FF33}" type="datetimeFigureOut">
               <a:rPr lang="en-US" smtClean="0"/>
-              <a:t>11/21/2019</a:t>
+              <a:t>11/22/2019</a:t>
             </a:fld>
             <a:endParaRPr lang="en-US"/>
           </a:p>
@@ -3110,7 +3110,7 @@
           <a:p>
             <a:fld id="{52626DC5-4832-44B9-B024-6945A7D6FF33}" type="datetimeFigureOut">
               <a:rPr lang="en-US" smtClean="0"/>
-              <a:t>11/21/2019</a:t>
+              <a:t>11/22/2019</a:t>
             </a:fld>
             <a:endParaRPr lang="en-US"/>
           </a:p>
@@ -3351,7 +3351,7 @@
           <a:p>
             <a:fld id="{52626DC5-4832-44B9-B024-6945A7D6FF33}" type="datetimeFigureOut">
               <a:rPr lang="en-US" smtClean="0"/>
-              <a:t>11/21/2019</a:t>
+              <a:t>11/22/2019</a:t>
             </a:fld>
             <a:endParaRPr lang="en-US"/>
           </a:p>
@@ -3919,7 +3919,7 @@
             <a:pPr lvl="1"/>
             <a:r>
               <a:rPr lang="en-US" dirty="0"/>
-              <a:t>What are the outcomes of these incidents? Which states with the highest number of killed and injured due to gun related violence?</a:t>
+              <a:t>What are the outcomes of these incidents? Which states have the highest number of killed and injured due to gun related violence?</a:t>
             </a:r>
           </a:p>
           <a:p>

</xml_diff>